<commit_message>
Update 05  Gen AI - Synthetic data generation.pptx
</commit_message>
<xml_diff>
--- a/slides/05  Gen AI - Synthetic data generation.pptx
+++ b/slides/05  Gen AI - Synthetic data generation.pptx
@@ -5,10 +5,10 @@
     <p:sldMasterId id="2147483648" r:id="rId1"/>
   </p:sldMasterIdLst>
   <p:notesMasterIdLst>
-    <p:notesMasterId r:id="rId28"/>
+    <p:notesMasterId r:id="rId29"/>
   </p:notesMasterIdLst>
   <p:handoutMasterIdLst>
-    <p:handoutMasterId r:id="rId29"/>
+    <p:handoutMasterId r:id="rId30"/>
   </p:handoutMasterIdLst>
   <p:sldIdLst>
     <p:sldId id="256" r:id="rId3"/>
@@ -28,14 +28,15 @@
     <p:sldId id="1492" r:id="rId17"/>
     <p:sldId id="1493" r:id="rId18"/>
     <p:sldId id="1495" r:id="rId19"/>
-    <p:sldId id="1498" r:id="rId20"/>
-    <p:sldId id="1499" r:id="rId21"/>
-    <p:sldId id="1500" r:id="rId22"/>
-    <p:sldId id="1501" r:id="rId23"/>
-    <p:sldId id="1502" r:id="rId24"/>
-    <p:sldId id="1503" r:id="rId25"/>
-    <p:sldId id="1488" r:id="rId26"/>
-    <p:sldId id="1315" r:id="rId27"/>
+    <p:sldId id="1507" r:id="rId20"/>
+    <p:sldId id="1498" r:id="rId21"/>
+    <p:sldId id="1499" r:id="rId22"/>
+    <p:sldId id="1500" r:id="rId23"/>
+    <p:sldId id="1501" r:id="rId24"/>
+    <p:sldId id="1502" r:id="rId25"/>
+    <p:sldId id="1503" r:id="rId26"/>
+    <p:sldId id="1488" r:id="rId27"/>
+    <p:sldId id="1315" r:id="rId28"/>
   </p:sldIdLst>
   <p:sldSz cx="12192000" cy="6858000"/>
   <p:notesSz cx="6858000" cy="9144000"/>
@@ -1780,7 +1781,7 @@
     </dsp:sp>
     <dsp:sp modelId="{353C3794-50AA-4D44-83C9-CE28317C3317}">
       <dsp:nvSpPr>
-        <dsp:cNvPr id="8" name="Right Arrow 7"/>
+        <dsp:cNvPr id="6" name="Right Arrow 5"/>
         <dsp:cNvSpPr/>
       </dsp:nvSpPr>
       <dsp:spPr bwMode="white">
@@ -1867,7 +1868,7 @@
     </dsp:sp>
     <dsp:sp modelId="{A1E15D63-E1FF-4A28-A04F-A2B65927BC31}">
       <dsp:nvSpPr>
-        <dsp:cNvPr id="9" name="Rounded Rectangle 8"/>
+        <dsp:cNvPr id="7" name="Rounded Rectangle 6"/>
         <dsp:cNvSpPr/>
       </dsp:nvSpPr>
       <dsp:spPr bwMode="white">
@@ -1952,7 +1953,7 @@
     </dsp:sp>
     <dsp:sp modelId="{3EC38FF8-ED19-4697-81A5-4ACAEE8FEC3B}">
       <dsp:nvSpPr>
-        <dsp:cNvPr id="10" name="Right Arrow 9"/>
+        <dsp:cNvPr id="8" name="Right Arrow 7"/>
         <dsp:cNvSpPr/>
       </dsp:nvSpPr>
       <dsp:spPr bwMode="white">
@@ -2038,7 +2039,7 @@
     </dsp:sp>
     <dsp:sp modelId="{CB518D10-391C-4B49-B671-6172485B577C}">
       <dsp:nvSpPr>
-        <dsp:cNvPr id="12" name="Rounded Rectangle 11"/>
+        <dsp:cNvPr id="9" name="Rounded Rectangle 8"/>
         <dsp:cNvSpPr/>
       </dsp:nvSpPr>
       <dsp:spPr bwMode="white">
@@ -2131,7 +2132,7 @@
     </dsp:sp>
     <dsp:sp modelId="{2C7D9017-4616-4DFB-9ADC-A4F1790C3332}">
       <dsp:nvSpPr>
-        <dsp:cNvPr id="13" name="Right Arrow 12"/>
+        <dsp:cNvPr id="10" name="Right Arrow 9"/>
         <dsp:cNvSpPr/>
       </dsp:nvSpPr>
       <dsp:spPr bwMode="white">
@@ -2302,7 +2303,7 @@
     </dsp:sp>
     <dsp:sp modelId="{A52CE000-8716-4895-BF38-8852EA80456B}">
       <dsp:nvSpPr>
-        <dsp:cNvPr id="14" name="Right Arrow 13"/>
+        <dsp:cNvPr id="12" name="Right Arrow 11"/>
         <dsp:cNvSpPr/>
       </dsp:nvSpPr>
       <dsp:spPr bwMode="white">
@@ -2388,7 +2389,7 @@
     </dsp:sp>
     <dsp:sp modelId="{21CEE5D3-B423-47E6-9C8D-C202905881B3}">
       <dsp:nvSpPr>
-        <dsp:cNvPr id="15" name="Rounded Rectangle 14"/>
+        <dsp:cNvPr id="13" name="Rounded Rectangle 12"/>
         <dsp:cNvSpPr/>
       </dsp:nvSpPr>
       <dsp:spPr bwMode="white">
@@ -2473,7 +2474,7 @@
     </dsp:sp>
     <dsp:sp modelId="{63787A9A-F36F-4560-B82F-C2F6E28F6FE3}">
       <dsp:nvSpPr>
-        <dsp:cNvPr id="16" name="Right Arrow 15"/>
+        <dsp:cNvPr id="14" name="Right Arrow 13"/>
         <dsp:cNvSpPr/>
       </dsp:nvSpPr>
       <dsp:spPr bwMode="white">
@@ -2559,7 +2560,7 @@
     </dsp:sp>
     <dsp:sp modelId="{00CA50E2-943D-43B4-957B-ED0463AB1C29}">
       <dsp:nvSpPr>
-        <dsp:cNvPr id="17" name="Rounded Rectangle 16"/>
+        <dsp:cNvPr id="15" name="Rounded Rectangle 14"/>
         <dsp:cNvSpPr/>
       </dsp:nvSpPr>
       <dsp:spPr bwMode="white">
@@ -8215,52 +8216,78 @@
         </p:nvSpPr>
         <p:spPr/>
         <p:txBody>
+          <a:bodyPr>
+            <a:normAutofit/>
+          </a:bodyPr>
+          <a:p>
+            <a:r>
+              <a:rPr lang="en-US"/>
+              <a:t>Use LLM as a judge to evaluate the quality</a:t>
+            </a:r>
+            <a:endParaRPr lang="en-US"/>
+          </a:p>
+        </p:txBody>
+      </p:sp>
+      <p:sp>
+        <p:nvSpPr>
+          <p:cNvPr id="3" name="Content Placeholder 2"/>
+          <p:cNvSpPr>
+            <a:spLocks noGrp="1"/>
+          </p:cNvSpPr>
+          <p:nvPr>
+            <p:ph idx="1"/>
+          </p:nvPr>
+        </p:nvSpPr>
+        <p:spPr>
+          <a:xfrm>
+            <a:off x="838200" y="1414145"/>
+            <a:ext cx="10515600" cy="4763135"/>
+          </a:xfrm>
+        </p:spPr>
+        <p:txBody>
           <a:bodyPr/>
           <a:p>
             <a:r>
+              <a:rPr lang="en-US">
+                <a:sym typeface="+mn-ea"/>
+              </a:rPr>
+              <a:t>Use LLM as a judge to evaluate the quality of generated data </a:t>
+            </a:r>
+            <a:endParaRPr lang="en-US"/>
+          </a:p>
+          <a:p>
+            <a:r>
               <a:rPr lang="en-US"/>
-              <a:t>Open AI cookbook Synthetic data generation  </a:t>
-            </a:r>
-            <a:endParaRPr lang="en-US"/>
-          </a:p>
-        </p:txBody>
-      </p:sp>
-      <p:sp>
-        <p:nvSpPr>
-          <p:cNvPr id="3" name="Content Placeholder 2"/>
-          <p:cNvSpPr>
-            <a:spLocks noGrp="1"/>
-          </p:cNvSpPr>
-          <p:nvPr>
-            <p:ph idx="1"/>
-          </p:nvPr>
-        </p:nvSpPr>
-        <p:spPr/>
-        <p:txBody>
-          <a:bodyPr/>
-          <a:p>
-            <a:r>
-              <a:rPr lang="en-US"/>
-              <a:t>CSV with a structured prompt</a:t>
-            </a:r>
-            <a:endParaRPr lang="en-US"/>
-          </a:p>
-          <a:p>
-            <a:r>
-              <a:rPr lang="en-US"/>
-              <a:t>Multitable CSV with a python program</a:t>
-            </a:r>
-            <a:endParaRPr lang="en-US"/>
-          </a:p>
-          <a:p>
-            <a:r>
-              <a:rPr lang="en-US"/>
-              <a:t>creating textual data</a:t>
-            </a:r>
-            <a:endParaRPr lang="en-US"/>
-          </a:p>
-        </p:txBody>
-      </p:sp>
+              <a:t>LLM-as-a-Judge, leveraging OpenAI's `gpt-4o` as an impartial judge (though we could have used any LLM to act as a judge), to compare the quality of data generated by the models below against human expert curated data from the </a:t>
+            </a:r>
+            <a:endParaRPr lang="en-US"/>
+          </a:p>
+        </p:txBody>
+      </p:sp>
+      <p:pic>
+        <p:nvPicPr>
+          <p:cNvPr id="4" name="Picture 3"/>
+          <p:cNvPicPr>
+            <a:picLocks noChangeAspect="1"/>
+          </p:cNvPicPr>
+          <p:nvPr/>
+        </p:nvPicPr>
+        <p:blipFill>
+          <a:blip r:embed="rId1"/>
+          <a:stretch>
+            <a:fillRect/>
+          </a:stretch>
+        </p:blipFill>
+        <p:spPr>
+          <a:xfrm>
+            <a:off x="7301230" y="3159760"/>
+            <a:ext cx="4052570" cy="3774440"/>
+          </a:xfrm>
+          <a:prstGeom prst="rect">
+            <a:avLst/>
+          </a:prstGeom>
+        </p:spPr>
+      </p:pic>
     </p:spTree>
   </p:cSld>
   <p:clrMapOvr>
@@ -8294,135 +8321,46 @@
           <a:bodyPr/>
           <a:p>
             <a:r>
-              <a:rPr lang="en-US">
-                <a:sym typeface="+mn-ea"/>
-              </a:rPr>
+              <a:rPr lang="en-US"/>
+              <a:t>Open AI cookbook Synthetic data generation  </a:t>
+            </a:r>
+            <a:endParaRPr lang="en-US"/>
+          </a:p>
+        </p:txBody>
+      </p:sp>
+      <p:sp>
+        <p:nvSpPr>
+          <p:cNvPr id="3" name="Content Placeholder 2"/>
+          <p:cNvSpPr>
+            <a:spLocks noGrp="1"/>
+          </p:cNvSpPr>
+          <p:nvPr>
+            <p:ph idx="1"/>
+          </p:nvPr>
+        </p:nvSpPr>
+        <p:spPr/>
+        <p:txBody>
+          <a:bodyPr/>
+          <a:p>
+            <a:r>
+              <a:rPr lang="en-US"/>
               <a:t>CSV with a structured prompt</a:t>
             </a:r>
             <a:endParaRPr lang="en-US"/>
           </a:p>
-        </p:txBody>
-      </p:sp>
-      <p:sp>
-        <p:nvSpPr>
-          <p:cNvPr id="3" name="Content Placeholder 2"/>
-          <p:cNvSpPr>
-            <a:spLocks noGrp="1"/>
-          </p:cNvSpPr>
-          <p:nvPr>
-            <p:ph idx="1"/>
-          </p:nvPr>
-        </p:nvSpPr>
-        <p:spPr/>
-        <p:txBody>
-          <a:bodyPr>
-            <a:noAutofit/>
-          </a:bodyPr>
-          <a:p>
-            <a:pPr marL="0" indent="0">
-              <a:buNone/>
-            </a:pPr>
-            <a:r>
-              <a:rPr lang="en-US" sz="2000"/>
-              <a:t>"""</a:t>
-            </a:r>
-            <a:endParaRPr lang="en-US" sz="2000"/>
-          </a:p>
-          <a:p>
-            <a:pPr marL="0" indent="0">
-              <a:buNone/>
-            </a:pPr>
-            <a:r>
-              <a:rPr lang="en-US" sz="2000"/>
-              <a:t>Create a CSV file with 10 rows of housing data.</a:t>
-            </a:r>
-            <a:endParaRPr lang="en-US" sz="2000"/>
-          </a:p>
-          <a:p>
-            <a:pPr marL="0" indent="0">
-              <a:buNone/>
-            </a:pPr>
-            <a:r>
-              <a:rPr lang="en-US" sz="2000"/>
-              <a:t>Each row should include the following fields:</a:t>
-            </a:r>
-            <a:endParaRPr lang="en-US" sz="2000"/>
-          </a:p>
-          <a:p>
-            <a:pPr marL="0" indent="0">
-              <a:buNone/>
-            </a:pPr>
-            <a:r>
-              <a:rPr lang="en-US" sz="2000"/>
-              <a:t> - id (incrementing integer starting at 1)</a:t>
-            </a:r>
-            <a:endParaRPr lang="en-US" sz="2000"/>
-          </a:p>
-          <a:p>
-            <a:pPr marL="0" indent="0">
-              <a:buNone/>
-            </a:pPr>
-            <a:r>
-              <a:rPr lang="en-US" sz="2000"/>
-              <a:t> - house size (m^2)</a:t>
-            </a:r>
-            <a:endParaRPr lang="en-US" sz="2000"/>
-          </a:p>
-          <a:p>
-            <a:pPr marL="0" indent="0">
-              <a:buNone/>
-            </a:pPr>
-            <a:r>
-              <a:rPr lang="en-US" sz="2000"/>
-              <a:t> - house price</a:t>
-            </a:r>
-            <a:endParaRPr lang="en-US" sz="2000"/>
-          </a:p>
-          <a:p>
-            <a:pPr marL="0" indent="0">
-              <a:buNone/>
-            </a:pPr>
-            <a:r>
-              <a:rPr lang="en-US" sz="2000"/>
-              <a:t> - location</a:t>
-            </a:r>
-            <a:endParaRPr lang="en-US" sz="2000"/>
-          </a:p>
-          <a:p>
-            <a:pPr marL="0" indent="0">
-              <a:buNone/>
-            </a:pPr>
-            <a:r>
-              <a:rPr lang="en-US" sz="2000"/>
-              <a:t> - number of bedrooms</a:t>
-            </a:r>
-            <a:endParaRPr lang="en-US" sz="2000"/>
-          </a:p>
-          <a:p>
-            <a:pPr marL="0" indent="0">
-              <a:buNone/>
-            </a:pPr>
-            <a:endParaRPr lang="en-US" sz="2000"/>
-          </a:p>
-          <a:p>
-            <a:pPr marL="0" indent="0">
-              <a:buNone/>
-            </a:pPr>
-            <a:r>
-              <a:rPr lang="en-US" sz="2000"/>
-              <a:t>Make sure that the numbers make sense (i.e. more rooms is usually bigger size, more expensive locations increase price. more size is usually higher price etc. make sure all the numbers make sense). Also only respond with the CSV.</a:t>
-            </a:r>
-            <a:endParaRPr lang="en-US" sz="2000"/>
-          </a:p>
-          <a:p>
-            <a:pPr marL="0" indent="0">
-              <a:buNone/>
-            </a:pPr>
-            <a:r>
-              <a:rPr lang="en-US" sz="2000"/>
-              <a:t>"""</a:t>
-            </a:r>
-            <a:endParaRPr lang="en-US" sz="2000"/>
+          <a:p>
+            <a:r>
+              <a:rPr lang="en-US"/>
+              <a:t>Multitable CSV with a python program</a:t>
+            </a:r>
+            <a:endParaRPr lang="en-US"/>
+          </a:p>
+          <a:p>
+            <a:r>
+              <a:rPr lang="en-US"/>
+              <a:t>creating textual data</a:t>
+            </a:r>
+            <a:endParaRPr lang="en-US"/>
           </a:p>
         </p:txBody>
       </p:sp>
@@ -8521,8 +8459,10 @@
           <a:bodyPr/>
           <a:p>
             <a:r>
-              <a:rPr lang="en-US"/>
-              <a:t>result </a:t>
+              <a:rPr lang="en-US">
+                <a:sym typeface="+mn-ea"/>
+              </a:rPr>
+              <a:t>CSV with a structured prompt</a:t>
             </a:r>
             <a:endParaRPr lang="en-US"/>
           </a:p>
@@ -8541,98 +8481,113 @@
         <p:spPr/>
         <p:txBody>
           <a:bodyPr>
-            <a:normAutofit fontScale="50000"/>
+            <a:noAutofit/>
           </a:bodyPr>
           <a:p>
-            <a:r>
-              <a:rPr lang="en-US"/>
-              <a:t>```csv</a:t>
-            </a:r>
-            <a:endParaRPr lang="en-US"/>
-          </a:p>
-          <a:p>
-            <a:r>
-              <a:rPr lang="en-US"/>
-              <a:t>id,house_size_m2,house_price,location,number_of_bedrooms</a:t>
-            </a:r>
-            <a:endParaRPr lang="en-US"/>
-          </a:p>
-          <a:p>
-            <a:r>
-              <a:rPr lang="en-US"/>
-              <a:t>1,50,150000,Suburban,2</a:t>
-            </a:r>
-            <a:endParaRPr lang="en-US"/>
-          </a:p>
-          <a:p>
-            <a:r>
-              <a:rPr lang="en-US"/>
-              <a:t>2,75,250000,City Center,3</a:t>
-            </a:r>
-            <a:endParaRPr lang="en-US"/>
-          </a:p>
-          <a:p>
-            <a:r>
-              <a:rPr lang="en-US"/>
-              <a:t>3,100,350000,Suburban,4</a:t>
-            </a:r>
-            <a:endParaRPr lang="en-US"/>
-          </a:p>
-          <a:p>
-            <a:r>
-              <a:rPr lang="en-US"/>
-              <a:t>4,120,450000,Suburban,4</a:t>
-            </a:r>
-            <a:endParaRPr lang="en-US"/>
-          </a:p>
-          <a:p>
-            <a:r>
-              <a:rPr lang="en-US"/>
-              <a:t>5,80,300000,City Center,3</a:t>
-            </a:r>
-            <a:endParaRPr lang="en-US"/>
-          </a:p>
-          <a:p>
-            <a:r>
-              <a:rPr lang="en-US"/>
-              <a:t>6,90,400000,City Center,3</a:t>
-            </a:r>
-            <a:endParaRPr lang="en-US"/>
-          </a:p>
-          <a:p>
-            <a:r>
-              <a:rPr lang="en-US"/>
-              <a:t>7,150,600000,Premium Area,5</a:t>
-            </a:r>
-            <a:endParaRPr lang="en-US"/>
-          </a:p>
-          <a:p>
-            <a:r>
-              <a:rPr lang="en-US"/>
-              <a:t>8,200,750000,Premium Area,5</a:t>
-            </a:r>
-            <a:endParaRPr lang="en-US"/>
-          </a:p>
-          <a:p>
-            <a:r>
-              <a:rPr lang="en-US"/>
-              <a:t>9,55,180000,Suburban,2</a:t>
-            </a:r>
-            <a:endParaRPr lang="en-US"/>
-          </a:p>
-          <a:p>
-            <a:r>
-              <a:rPr lang="en-US"/>
-              <a:t>10,300,950000,Premium Area,6</a:t>
-            </a:r>
-            <a:endParaRPr lang="en-US"/>
-          </a:p>
-          <a:p>
-            <a:r>
-              <a:rPr lang="en-US"/>
-              <a:t>```</a:t>
-            </a:r>
-            <a:endParaRPr lang="en-US"/>
+            <a:pPr marL="0" indent="0">
+              <a:buNone/>
+            </a:pPr>
+            <a:r>
+              <a:rPr lang="en-US" sz="2000"/>
+              <a:t>"""</a:t>
+            </a:r>
+            <a:endParaRPr lang="en-US" sz="2000"/>
+          </a:p>
+          <a:p>
+            <a:pPr marL="0" indent="0">
+              <a:buNone/>
+            </a:pPr>
+            <a:r>
+              <a:rPr lang="en-US" sz="2000"/>
+              <a:t>Create a CSV file with 10 rows of housing data.</a:t>
+            </a:r>
+            <a:endParaRPr lang="en-US" sz="2000"/>
+          </a:p>
+          <a:p>
+            <a:pPr marL="0" indent="0">
+              <a:buNone/>
+            </a:pPr>
+            <a:r>
+              <a:rPr lang="en-US" sz="2000"/>
+              <a:t>Each row should include the following fields:</a:t>
+            </a:r>
+            <a:endParaRPr lang="en-US" sz="2000"/>
+          </a:p>
+          <a:p>
+            <a:pPr marL="0" indent="0">
+              <a:buNone/>
+            </a:pPr>
+            <a:r>
+              <a:rPr lang="en-US" sz="2000"/>
+              <a:t> - id (incrementing integer starting at 1)</a:t>
+            </a:r>
+            <a:endParaRPr lang="en-US" sz="2000"/>
+          </a:p>
+          <a:p>
+            <a:pPr marL="0" indent="0">
+              <a:buNone/>
+            </a:pPr>
+            <a:r>
+              <a:rPr lang="en-US" sz="2000"/>
+              <a:t> - house size (m^2)</a:t>
+            </a:r>
+            <a:endParaRPr lang="en-US" sz="2000"/>
+          </a:p>
+          <a:p>
+            <a:pPr marL="0" indent="0">
+              <a:buNone/>
+            </a:pPr>
+            <a:r>
+              <a:rPr lang="en-US" sz="2000"/>
+              <a:t> - house price</a:t>
+            </a:r>
+            <a:endParaRPr lang="en-US" sz="2000"/>
+          </a:p>
+          <a:p>
+            <a:pPr marL="0" indent="0">
+              <a:buNone/>
+            </a:pPr>
+            <a:r>
+              <a:rPr lang="en-US" sz="2000"/>
+              <a:t> - location</a:t>
+            </a:r>
+            <a:endParaRPr lang="en-US" sz="2000"/>
+          </a:p>
+          <a:p>
+            <a:pPr marL="0" indent="0">
+              <a:buNone/>
+            </a:pPr>
+            <a:r>
+              <a:rPr lang="en-US" sz="2000"/>
+              <a:t> - number of bedrooms</a:t>
+            </a:r>
+            <a:endParaRPr lang="en-US" sz="2000"/>
+          </a:p>
+          <a:p>
+            <a:pPr marL="0" indent="0">
+              <a:buNone/>
+            </a:pPr>
+            <a:endParaRPr lang="en-US" sz="2000"/>
+          </a:p>
+          <a:p>
+            <a:pPr marL="0" indent="0">
+              <a:buNone/>
+            </a:pPr>
+            <a:r>
+              <a:rPr lang="en-US" sz="2000"/>
+              <a:t>Make sure that the numbers make sense (i.e. more rooms is usually bigger size, more expensive locations increase price. more size is usually higher price etc. make sure all the numbers make sense). Also only respond with the CSV.</a:t>
+            </a:r>
+            <a:endParaRPr lang="en-US" sz="2000"/>
+          </a:p>
+          <a:p>
+            <a:pPr marL="0" indent="0">
+              <a:buNone/>
+            </a:pPr>
+            <a:r>
+              <a:rPr lang="en-US" sz="2000"/>
+              <a:t>"""</a:t>
+            </a:r>
+            <a:endParaRPr lang="en-US" sz="2000"/>
           </a:p>
         </p:txBody>
       </p:sp>
@@ -8656,7 +8611,7 @@
       <p:grpSpPr/>
       <p:sp>
         <p:nvSpPr>
-          <p:cNvPr id="4" name="Title 3"/>
+          <p:cNvPr id="2" name="Title 1"/>
           <p:cNvSpPr>
             <a:spLocks noGrp="1"/>
           </p:cNvSpPr>
@@ -8664,401 +8619,122 @@
             <p:ph type="title"/>
           </p:nvPr>
         </p:nvSpPr>
-        <p:spPr>
-          <a:xfrm>
-            <a:off x="838200" y="-635"/>
-            <a:ext cx="10515600" cy="922655"/>
-          </a:xfrm>
-        </p:spPr>
-        <p:txBody>
-          <a:bodyPr>
-            <a:normAutofit/>
-          </a:bodyPr>
-          <a:p>
-            <a:r>
-              <a:rPr lang="en-US">
-                <a:sym typeface="+mn-ea"/>
-              </a:rPr>
-              <a:t>Multitable CSV with a python program</a:t>
-            </a:r>
-            <a:endParaRPr lang="en-US"/>
-          </a:p>
-        </p:txBody>
-      </p:sp>
-      <p:sp>
-        <p:nvSpPr>
-          <p:cNvPr id="5" name="Content Placeholder 4"/>
-          <p:cNvSpPr>
-            <a:spLocks noGrp="1"/>
-          </p:cNvSpPr>
-          <p:nvPr>
-            <p:ph sz="half" idx="1"/>
-          </p:nvPr>
-        </p:nvSpPr>
-        <p:spPr>
-          <a:xfrm>
-            <a:off x="838200" y="922020"/>
-            <a:ext cx="5181600" cy="5255260"/>
-          </a:xfrm>
-        </p:spPr>
-        <p:txBody>
-          <a:bodyPr>
-            <a:noAutofit/>
-          </a:bodyPr>
-          <a:p>
-            <a:pPr marL="0" indent="0">
-              <a:buNone/>
-            </a:pPr>
-            <a:r>
-              <a:rPr lang="en-US" sz="1200"/>
-              <a:t>"""</a:t>
-            </a:r>
-            <a:endParaRPr lang="en-US" sz="1200"/>
-          </a:p>
-          <a:p>
-            <a:pPr marL="0" indent="0">
-              <a:buNone/>
-            </a:pPr>
-            <a:r>
-              <a:rPr lang="en-US" sz="1200"/>
-              <a:t>Create a Python program to generate 3 different pandas dataframes.</a:t>
-            </a:r>
-            <a:endParaRPr lang="en-US" sz="1200"/>
-          </a:p>
-          <a:p>
-            <a:pPr marL="0" indent="0">
-              <a:buNone/>
-            </a:pPr>
-            <a:r>
-              <a:rPr lang="en-US" sz="1200"/>
-              <a:t>1. Housing data</a:t>
-            </a:r>
-            <a:endParaRPr lang="en-US" sz="1200"/>
-          </a:p>
-          <a:p>
-            <a:pPr marL="0" indent="0">
-              <a:buNone/>
-            </a:pPr>
-            <a:r>
-              <a:rPr lang="en-US" sz="1200"/>
-              <a:t>I want 100 rows. Each row should include the following fields:</a:t>
-            </a:r>
-            <a:endParaRPr lang="en-US" sz="1200"/>
-          </a:p>
-          <a:p>
-            <a:pPr marL="0" indent="0">
-              <a:buNone/>
-            </a:pPr>
-            <a:r>
-              <a:rPr lang="en-US" sz="1200"/>
-              <a:t> - id (incrementing integer starting at 1)</a:t>
-            </a:r>
-            <a:endParaRPr lang="en-US" sz="1200"/>
-          </a:p>
-          <a:p>
-            <a:pPr marL="0" indent="0">
-              <a:buNone/>
-            </a:pPr>
-            <a:r>
-              <a:rPr lang="en-US" sz="1200"/>
-              <a:t> - house size (m^2)</a:t>
-            </a:r>
-            <a:endParaRPr lang="en-US" sz="1200"/>
-          </a:p>
-          <a:p>
-            <a:pPr marL="0" indent="0">
-              <a:buNone/>
-            </a:pPr>
-            <a:r>
-              <a:rPr lang="en-US" sz="1200"/>
-              <a:t> - house price</a:t>
-            </a:r>
-            <a:endParaRPr lang="en-US" sz="1200"/>
-          </a:p>
-          <a:p>
-            <a:pPr marL="0" indent="0">
-              <a:buNone/>
-            </a:pPr>
-            <a:r>
-              <a:rPr lang="en-US" sz="1200"/>
-              <a:t> - location</a:t>
-            </a:r>
-            <a:endParaRPr lang="en-US" sz="1200"/>
-          </a:p>
-          <a:p>
-            <a:pPr marL="0" indent="0">
-              <a:buNone/>
-            </a:pPr>
-            <a:r>
-              <a:rPr lang="en-US" sz="1200"/>
-              <a:t> - number of bedrooms</a:t>
-            </a:r>
-            <a:endParaRPr lang="en-US" sz="1200"/>
-          </a:p>
-          <a:p>
-            <a:pPr marL="0" indent="0">
-              <a:buNone/>
-            </a:pPr>
-            <a:r>
-              <a:rPr lang="en-US" sz="1200"/>
-              <a:t> - house type</a:t>
-            </a:r>
-            <a:endParaRPr lang="en-US" sz="1200"/>
-          </a:p>
-          <a:p>
-            <a:pPr marL="0" indent="0">
-              <a:buNone/>
-            </a:pPr>
-            <a:r>
-              <a:rPr lang="en-US" sz="1200"/>
-              <a:t> + any relevant foreign keys</a:t>
-            </a:r>
-            <a:endParaRPr lang="en-US" sz="1200"/>
-          </a:p>
-          <a:p>
-            <a:pPr marL="0" indent="0">
-              <a:buNone/>
-            </a:pPr>
-            <a:r>
-              <a:rPr lang="en-US" sz="1200"/>
-              <a:t>2. Location</a:t>
-            </a:r>
-            <a:endParaRPr lang="en-US" sz="1200"/>
-          </a:p>
-          <a:p>
-            <a:pPr marL="0" indent="0">
-              <a:buNone/>
-            </a:pPr>
-            <a:r>
-              <a:rPr lang="en-US" sz="1200"/>
-              <a:t>Each row should include the following fields:</a:t>
-            </a:r>
-            <a:endParaRPr lang="en-US" sz="1200"/>
-          </a:p>
-          <a:p>
-            <a:pPr marL="0" indent="0">
-              <a:buNone/>
-            </a:pPr>
-            <a:r>
-              <a:rPr lang="en-US" sz="1200"/>
-              <a:t> - id (incrementing integer starting at 1)</a:t>
-            </a:r>
-            <a:endParaRPr lang="en-US" sz="1200"/>
-          </a:p>
-          <a:p>
-            <a:pPr marL="0" indent="0">
-              <a:buNone/>
-            </a:pPr>
-            <a:r>
-              <a:rPr lang="en-US" sz="1200"/>
-              <a:t> - country</a:t>
-            </a:r>
-            <a:endParaRPr lang="en-US" sz="1200"/>
-          </a:p>
-          <a:p>
-            <a:pPr marL="0" indent="0">
-              <a:buNone/>
-            </a:pPr>
-            <a:r>
-              <a:rPr lang="en-US" sz="1200"/>
-              <a:t> - city</a:t>
-            </a:r>
-            <a:endParaRPr lang="en-US" sz="1200"/>
-          </a:p>
-          <a:p>
-            <a:pPr marL="0" indent="0">
-              <a:buNone/>
-            </a:pPr>
-            <a:r>
-              <a:rPr lang="en-US" sz="1200"/>
-              <a:t> - population</a:t>
-            </a:r>
-            <a:endParaRPr lang="en-US" sz="1200"/>
-          </a:p>
-          <a:p>
-            <a:pPr marL="0" indent="0">
-              <a:buNone/>
-            </a:pPr>
-            <a:r>
-              <a:rPr lang="en-US" sz="1200"/>
-              <a:t> - area (m^2)</a:t>
-            </a:r>
-            <a:endParaRPr lang="en-US" sz="1200"/>
-          </a:p>
-          <a:p>
-            <a:pPr marL="0" indent="0">
-              <a:buNone/>
-            </a:pPr>
-            <a:r>
-              <a:rPr lang="en-US" sz="1200"/>
-              <a:t> + any relevant foreign keys</a:t>
-            </a:r>
-            <a:endParaRPr lang="en-US" sz="1200"/>
-          </a:p>
-        </p:txBody>
-      </p:sp>
-      <p:sp>
-        <p:nvSpPr>
-          <p:cNvPr id="6" name="Content Placeholder 5"/>
-          <p:cNvSpPr>
-            <a:spLocks noGrp="1"/>
-          </p:cNvSpPr>
-          <p:nvPr>
-            <p:ph sz="half" idx="2"/>
-          </p:nvPr>
-        </p:nvSpPr>
-        <p:spPr>
-          <a:xfrm>
-            <a:off x="6172200" y="922020"/>
-            <a:ext cx="5181600" cy="5255260"/>
-          </a:xfrm>
-        </p:spPr>
+        <p:spPr/>
+        <p:txBody>
+          <a:bodyPr/>
+          <a:p>
+            <a:r>
+              <a:rPr lang="en-US"/>
+              <a:t>result </a:t>
+            </a:r>
+            <a:endParaRPr lang="en-US"/>
+          </a:p>
+        </p:txBody>
+      </p:sp>
+      <p:sp>
+        <p:nvSpPr>
+          <p:cNvPr id="3" name="Content Placeholder 2"/>
+          <p:cNvSpPr>
+            <a:spLocks noGrp="1"/>
+          </p:cNvSpPr>
+          <p:nvPr>
+            <p:ph idx="1"/>
+          </p:nvPr>
+        </p:nvSpPr>
+        <p:spPr/>
         <p:txBody>
           <a:bodyPr>
             <a:normAutofit fontScale="50000"/>
           </a:bodyPr>
           <a:p>
-            <a:pPr marL="0" indent="0">
-              <a:buNone/>
-            </a:pPr>
-            <a:r>
-              <a:rPr lang="en-US">
-                <a:sym typeface="+mn-ea"/>
-              </a:rPr>
-              <a:t> 3. House types</a:t>
-            </a:r>
-            <a:endParaRPr lang="en-US"/>
-          </a:p>
-          <a:p>
-            <a:pPr marL="0" indent="0">
-              <a:buNone/>
-            </a:pPr>
-            <a:r>
-              <a:rPr lang="en-US">
-                <a:sym typeface="+mn-ea"/>
-              </a:rPr>
-              <a:t> - id (incrementing integer starting at 1)</a:t>
-            </a:r>
-            <a:endParaRPr lang="en-US"/>
-          </a:p>
-          <a:p>
-            <a:pPr marL="0" indent="0">
-              <a:buNone/>
-            </a:pPr>
-            <a:r>
-              <a:rPr lang="en-US">
-                <a:sym typeface="+mn-ea"/>
-              </a:rPr>
-              <a:t> - house type</a:t>
-            </a:r>
-            <a:endParaRPr lang="en-US"/>
-          </a:p>
-          <a:p>
-            <a:pPr marL="0" indent="0">
-              <a:buNone/>
-            </a:pPr>
-            <a:r>
-              <a:rPr lang="en-US">
-                <a:sym typeface="+mn-ea"/>
-              </a:rPr>
-              <a:t> - average house type price</a:t>
-            </a:r>
-            <a:endParaRPr lang="en-US"/>
-          </a:p>
-          <a:p>
-            <a:pPr marL="0" indent="0">
-              <a:buNone/>
-            </a:pPr>
-            <a:r>
-              <a:rPr lang="en-US">
-                <a:sym typeface="+mn-ea"/>
-              </a:rPr>
-              <a:t> - number of houses</a:t>
-            </a:r>
-            <a:endParaRPr lang="en-US"/>
-          </a:p>
-          <a:p>
-            <a:pPr marL="0" indent="0">
-              <a:buNone/>
-            </a:pPr>
-            <a:r>
-              <a:rPr lang="en-US">
-                <a:sym typeface="+mn-ea"/>
-              </a:rPr>
-              <a:t> + any relevant foreign keys</a:t>
-            </a:r>
-            <a:endParaRPr lang="en-US"/>
-          </a:p>
-          <a:p>
-            <a:pPr marL="0" indent="0">
-              <a:buNone/>
-            </a:pPr>
-            <a:endParaRPr lang="en-US"/>
-          </a:p>
-          <a:p>
-            <a:pPr marL="0" indent="0">
-              <a:buNone/>
-            </a:pPr>
-            <a:r>
-              <a:rPr lang="en-US">
-                <a:sym typeface="+mn-ea"/>
-              </a:rPr>
-              <a:t>Make sure that the numbers make sense (i.e. more rooms is usually bigger size, more expensive locations increase price. more size is usually higher price etc. make sure all the numbers make sense).</a:t>
-            </a:r>
-            <a:endParaRPr lang="en-US"/>
-          </a:p>
-          <a:p>
-            <a:pPr marL="0" indent="0">
-              <a:buNone/>
-            </a:pPr>
-            <a:r>
-              <a:rPr lang="en-US">
-                <a:sym typeface="+mn-ea"/>
-              </a:rPr>
-              <a:t>Make sure that the dataframe generally follow common sense checks, e.g. the size of the dataframes make sense in comparison with one another.</a:t>
-            </a:r>
-            <a:endParaRPr lang="en-US"/>
-          </a:p>
-          <a:p>
-            <a:pPr marL="0" indent="0">
-              <a:buNone/>
-            </a:pPr>
-            <a:r>
-              <a:rPr lang="en-US">
-                <a:sym typeface="+mn-ea"/>
-              </a:rPr>
-              <a:t>Make sure the foreign keys match up and you can use previously generated dataframes when creating each consecutive dataframes.</a:t>
-            </a:r>
-            <a:endParaRPr lang="en-US"/>
-          </a:p>
-          <a:p>
-            <a:pPr marL="0" indent="0">
-              <a:buNone/>
-            </a:pPr>
-            <a:r>
-              <a:rPr lang="en-US">
-                <a:sym typeface="+mn-ea"/>
-              </a:rPr>
-              <a:t>You can use the previously generated dataframe to generate the next dataframe.</a:t>
-            </a:r>
-            <a:endParaRPr lang="en-US"/>
-          </a:p>
-          <a:p>
-            <a:pPr marL="0" indent="0">
-              <a:buNone/>
-            </a:pPr>
-            <a:r>
-              <a:rPr lang="en-US">
-                <a:sym typeface="+mn-ea"/>
-              </a:rPr>
-              <a:t>"""</a:t>
-            </a:r>
-            <a:endParaRPr lang="en-US"/>
-          </a:p>
-          <a:p>
-            <a:pPr marL="0" indent="0">
-              <a:buNone/>
-            </a:pPr>
+            <a:r>
+              <a:rPr lang="en-US"/>
+              <a:t>```csv</a:t>
+            </a:r>
+            <a:endParaRPr lang="en-US"/>
+          </a:p>
+          <a:p>
+            <a:r>
+              <a:rPr lang="en-US"/>
+              <a:t>id,house_size_m2,house_price,location,number_of_bedrooms</a:t>
+            </a:r>
+            <a:endParaRPr lang="en-US"/>
+          </a:p>
+          <a:p>
+            <a:r>
+              <a:rPr lang="en-US"/>
+              <a:t>1,50,150000,Suburban,2</a:t>
+            </a:r>
+            <a:endParaRPr lang="en-US"/>
+          </a:p>
+          <a:p>
+            <a:r>
+              <a:rPr lang="en-US"/>
+              <a:t>2,75,250000,City Center,3</a:t>
+            </a:r>
+            <a:endParaRPr lang="en-US"/>
+          </a:p>
+          <a:p>
+            <a:r>
+              <a:rPr lang="en-US"/>
+              <a:t>3,100,350000,Suburban,4</a:t>
+            </a:r>
+            <a:endParaRPr lang="en-US"/>
+          </a:p>
+          <a:p>
+            <a:r>
+              <a:rPr lang="en-US"/>
+              <a:t>4,120,450000,Suburban,4</a:t>
+            </a:r>
+            <a:endParaRPr lang="en-US"/>
+          </a:p>
+          <a:p>
+            <a:r>
+              <a:rPr lang="en-US"/>
+              <a:t>5,80,300000,City Center,3</a:t>
+            </a:r>
+            <a:endParaRPr lang="en-US"/>
+          </a:p>
+          <a:p>
+            <a:r>
+              <a:rPr lang="en-US"/>
+              <a:t>6,90,400000,City Center,3</a:t>
+            </a:r>
+            <a:endParaRPr lang="en-US"/>
+          </a:p>
+          <a:p>
+            <a:r>
+              <a:rPr lang="en-US"/>
+              <a:t>7,150,600000,Premium Area,5</a:t>
+            </a:r>
+            <a:endParaRPr lang="en-US"/>
+          </a:p>
+          <a:p>
+            <a:r>
+              <a:rPr lang="en-US"/>
+              <a:t>8,200,750000,Premium Area,5</a:t>
+            </a:r>
+            <a:endParaRPr lang="en-US"/>
+          </a:p>
+          <a:p>
+            <a:r>
+              <a:rPr lang="en-US"/>
+              <a:t>9,55,180000,Suburban,2</a:t>
+            </a:r>
+            <a:endParaRPr lang="en-US"/>
+          </a:p>
+          <a:p>
+            <a:r>
+              <a:rPr lang="en-US"/>
+              <a:t>10,300,950000,Premium Area,6</a:t>
+            </a:r>
+            <a:endParaRPr lang="en-US"/>
+          </a:p>
+          <a:p>
+            <a:r>
+              <a:rPr lang="en-US"/>
+              <a:t>```</a:t>
+            </a:r>
             <a:endParaRPr lang="en-US"/>
           </a:p>
         </p:txBody>
@@ -9083,7 +8759,7 @@
       <p:grpSpPr/>
       <p:sp>
         <p:nvSpPr>
-          <p:cNvPr id="2" name="Title 1"/>
+          <p:cNvPr id="4" name="Title 3"/>
           <p:cNvSpPr>
             <a:spLocks noGrp="1"/>
           </p:cNvSpPr>
@@ -9091,13 +8767,22 @@
             <p:ph type="title"/>
           </p:nvPr>
         </p:nvSpPr>
-        <p:spPr/>
-        <p:txBody>
-          <a:bodyPr/>
-          <a:p>
-            <a:r>
-              <a:rPr lang="en-US"/>
-              <a:t>creating textual data</a:t>
+        <p:spPr>
+          <a:xfrm>
+            <a:off x="838200" y="-635"/>
+            <a:ext cx="10515600" cy="922655"/>
+          </a:xfrm>
+        </p:spPr>
+        <p:txBody>
+          <a:bodyPr>
+            <a:normAutofit/>
+          </a:bodyPr>
+          <a:p>
+            <a:r>
+              <a:rPr lang="en-US">
+                <a:sym typeface="+mn-ea"/>
+              </a:rPr>
+              <a:t>Multitable CSV with a python program</a:t>
             </a:r>
             <a:endParaRPr lang="en-US"/>
           </a:p>
@@ -9110,10 +8795,227 @@
             <a:spLocks noGrp="1"/>
           </p:cNvSpPr>
           <p:nvPr>
-            <p:ph idx="1"/>
-          </p:nvPr>
-        </p:nvSpPr>
-        <p:spPr/>
+            <p:ph sz="half" idx="1"/>
+          </p:nvPr>
+        </p:nvSpPr>
+        <p:spPr>
+          <a:xfrm>
+            <a:off x="838200" y="922020"/>
+            <a:ext cx="5181600" cy="5255260"/>
+          </a:xfrm>
+        </p:spPr>
+        <p:txBody>
+          <a:bodyPr>
+            <a:noAutofit/>
+          </a:bodyPr>
+          <a:p>
+            <a:pPr marL="0" indent="0">
+              <a:buNone/>
+            </a:pPr>
+            <a:r>
+              <a:rPr lang="en-US" sz="1200"/>
+              <a:t>"""</a:t>
+            </a:r>
+            <a:endParaRPr lang="en-US" sz="1200"/>
+          </a:p>
+          <a:p>
+            <a:pPr marL="0" indent="0">
+              <a:buNone/>
+            </a:pPr>
+            <a:r>
+              <a:rPr lang="en-US" sz="1200"/>
+              <a:t>Create a Python program to generate 3 different pandas dataframes.</a:t>
+            </a:r>
+            <a:endParaRPr lang="en-US" sz="1200"/>
+          </a:p>
+          <a:p>
+            <a:pPr marL="0" indent="0">
+              <a:buNone/>
+            </a:pPr>
+            <a:r>
+              <a:rPr lang="en-US" sz="1200"/>
+              <a:t>1. Housing data</a:t>
+            </a:r>
+            <a:endParaRPr lang="en-US" sz="1200"/>
+          </a:p>
+          <a:p>
+            <a:pPr marL="0" indent="0">
+              <a:buNone/>
+            </a:pPr>
+            <a:r>
+              <a:rPr lang="en-US" sz="1200"/>
+              <a:t>I want 100 rows. Each row should include the following fields:</a:t>
+            </a:r>
+            <a:endParaRPr lang="en-US" sz="1200"/>
+          </a:p>
+          <a:p>
+            <a:pPr marL="0" indent="0">
+              <a:buNone/>
+            </a:pPr>
+            <a:r>
+              <a:rPr lang="en-US" sz="1200"/>
+              <a:t> - id (incrementing integer starting at 1)</a:t>
+            </a:r>
+            <a:endParaRPr lang="en-US" sz="1200"/>
+          </a:p>
+          <a:p>
+            <a:pPr marL="0" indent="0">
+              <a:buNone/>
+            </a:pPr>
+            <a:r>
+              <a:rPr lang="en-US" sz="1200"/>
+              <a:t> - house size (m^2)</a:t>
+            </a:r>
+            <a:endParaRPr lang="en-US" sz="1200"/>
+          </a:p>
+          <a:p>
+            <a:pPr marL="0" indent="0">
+              <a:buNone/>
+            </a:pPr>
+            <a:r>
+              <a:rPr lang="en-US" sz="1200"/>
+              <a:t> - house price</a:t>
+            </a:r>
+            <a:endParaRPr lang="en-US" sz="1200"/>
+          </a:p>
+          <a:p>
+            <a:pPr marL="0" indent="0">
+              <a:buNone/>
+            </a:pPr>
+            <a:r>
+              <a:rPr lang="en-US" sz="1200"/>
+              <a:t> - location</a:t>
+            </a:r>
+            <a:endParaRPr lang="en-US" sz="1200"/>
+          </a:p>
+          <a:p>
+            <a:pPr marL="0" indent="0">
+              <a:buNone/>
+            </a:pPr>
+            <a:r>
+              <a:rPr lang="en-US" sz="1200"/>
+              <a:t> - number of bedrooms</a:t>
+            </a:r>
+            <a:endParaRPr lang="en-US" sz="1200"/>
+          </a:p>
+          <a:p>
+            <a:pPr marL="0" indent="0">
+              <a:buNone/>
+            </a:pPr>
+            <a:r>
+              <a:rPr lang="en-US" sz="1200"/>
+              <a:t> - house type</a:t>
+            </a:r>
+            <a:endParaRPr lang="en-US" sz="1200"/>
+          </a:p>
+          <a:p>
+            <a:pPr marL="0" indent="0">
+              <a:buNone/>
+            </a:pPr>
+            <a:r>
+              <a:rPr lang="en-US" sz="1200"/>
+              <a:t> + any relevant foreign keys</a:t>
+            </a:r>
+            <a:endParaRPr lang="en-US" sz="1200"/>
+          </a:p>
+          <a:p>
+            <a:pPr marL="0" indent="0">
+              <a:buNone/>
+            </a:pPr>
+            <a:r>
+              <a:rPr lang="en-US" sz="1200"/>
+              <a:t>2. Location</a:t>
+            </a:r>
+            <a:endParaRPr lang="en-US" sz="1200"/>
+          </a:p>
+          <a:p>
+            <a:pPr marL="0" indent="0">
+              <a:buNone/>
+            </a:pPr>
+            <a:r>
+              <a:rPr lang="en-US" sz="1200"/>
+              <a:t>Each row should include the following fields:</a:t>
+            </a:r>
+            <a:endParaRPr lang="en-US" sz="1200"/>
+          </a:p>
+          <a:p>
+            <a:pPr marL="0" indent="0">
+              <a:buNone/>
+            </a:pPr>
+            <a:r>
+              <a:rPr lang="en-US" sz="1200"/>
+              <a:t> - id (incrementing integer starting at 1)</a:t>
+            </a:r>
+            <a:endParaRPr lang="en-US" sz="1200"/>
+          </a:p>
+          <a:p>
+            <a:pPr marL="0" indent="0">
+              <a:buNone/>
+            </a:pPr>
+            <a:r>
+              <a:rPr lang="en-US" sz="1200"/>
+              <a:t> - country</a:t>
+            </a:r>
+            <a:endParaRPr lang="en-US" sz="1200"/>
+          </a:p>
+          <a:p>
+            <a:pPr marL="0" indent="0">
+              <a:buNone/>
+            </a:pPr>
+            <a:r>
+              <a:rPr lang="en-US" sz="1200"/>
+              <a:t> - city</a:t>
+            </a:r>
+            <a:endParaRPr lang="en-US" sz="1200"/>
+          </a:p>
+          <a:p>
+            <a:pPr marL="0" indent="0">
+              <a:buNone/>
+            </a:pPr>
+            <a:r>
+              <a:rPr lang="en-US" sz="1200"/>
+              <a:t> - population</a:t>
+            </a:r>
+            <a:endParaRPr lang="en-US" sz="1200"/>
+          </a:p>
+          <a:p>
+            <a:pPr marL="0" indent="0">
+              <a:buNone/>
+            </a:pPr>
+            <a:r>
+              <a:rPr lang="en-US" sz="1200"/>
+              <a:t> - area (m^2)</a:t>
+            </a:r>
+            <a:endParaRPr lang="en-US" sz="1200"/>
+          </a:p>
+          <a:p>
+            <a:pPr marL="0" indent="0">
+              <a:buNone/>
+            </a:pPr>
+            <a:r>
+              <a:rPr lang="en-US" sz="1200"/>
+              <a:t> + any relevant foreign keys</a:t>
+            </a:r>
+            <a:endParaRPr lang="en-US" sz="1200"/>
+          </a:p>
+        </p:txBody>
+      </p:sp>
+      <p:sp>
+        <p:nvSpPr>
+          <p:cNvPr id="6" name="Content Placeholder 5"/>
+          <p:cNvSpPr>
+            <a:spLocks noGrp="1"/>
+          </p:cNvSpPr>
+          <p:nvPr>
+            <p:ph sz="half" idx="2"/>
+          </p:nvPr>
+        </p:nvSpPr>
+        <p:spPr>
+          <a:xfrm>
+            <a:off x="6172200" y="922020"/>
+            <a:ext cx="5181600" cy="5255260"/>
+          </a:xfrm>
+        </p:spPr>
         <p:txBody>
           <a:bodyPr>
             <a:normAutofit fontScale="50000"/>
@@ -9123,7 +9025,135 @@
               <a:buNone/>
             </a:pPr>
             <a:r>
-              <a:rPr lang="en-US"/>
+              <a:rPr lang="en-US">
+                <a:sym typeface="+mn-ea"/>
+              </a:rPr>
+              <a:t> 3. House types</a:t>
+            </a:r>
+            <a:endParaRPr lang="en-US"/>
+          </a:p>
+          <a:p>
+            <a:pPr marL="0" indent="0">
+              <a:buNone/>
+            </a:pPr>
+            <a:r>
+              <a:rPr lang="en-US">
+                <a:sym typeface="+mn-ea"/>
+              </a:rPr>
+              <a:t> - id (incrementing integer starting at 1)</a:t>
+            </a:r>
+            <a:endParaRPr lang="en-US"/>
+          </a:p>
+          <a:p>
+            <a:pPr marL="0" indent="0">
+              <a:buNone/>
+            </a:pPr>
+            <a:r>
+              <a:rPr lang="en-US">
+                <a:sym typeface="+mn-ea"/>
+              </a:rPr>
+              <a:t> - house type</a:t>
+            </a:r>
+            <a:endParaRPr lang="en-US"/>
+          </a:p>
+          <a:p>
+            <a:pPr marL="0" indent="0">
+              <a:buNone/>
+            </a:pPr>
+            <a:r>
+              <a:rPr lang="en-US">
+                <a:sym typeface="+mn-ea"/>
+              </a:rPr>
+              <a:t> - average house type price</a:t>
+            </a:r>
+            <a:endParaRPr lang="en-US"/>
+          </a:p>
+          <a:p>
+            <a:pPr marL="0" indent="0">
+              <a:buNone/>
+            </a:pPr>
+            <a:r>
+              <a:rPr lang="en-US">
+                <a:sym typeface="+mn-ea"/>
+              </a:rPr>
+              <a:t> - number of houses</a:t>
+            </a:r>
+            <a:endParaRPr lang="en-US"/>
+          </a:p>
+          <a:p>
+            <a:pPr marL="0" indent="0">
+              <a:buNone/>
+            </a:pPr>
+            <a:r>
+              <a:rPr lang="en-US">
+                <a:sym typeface="+mn-ea"/>
+              </a:rPr>
+              <a:t> + any relevant foreign keys</a:t>
+            </a:r>
+            <a:endParaRPr lang="en-US"/>
+          </a:p>
+          <a:p>
+            <a:pPr marL="0" indent="0">
+              <a:buNone/>
+            </a:pPr>
+            <a:endParaRPr lang="en-US"/>
+          </a:p>
+          <a:p>
+            <a:pPr marL="0" indent="0">
+              <a:buNone/>
+            </a:pPr>
+            <a:r>
+              <a:rPr lang="en-US">
+                <a:sym typeface="+mn-ea"/>
+              </a:rPr>
+              <a:t>Make sure that the numbers make sense (i.e. more rooms is usually bigger size, more expensive locations increase price. more size is usually higher price etc. make sure all the numbers make sense).</a:t>
+            </a:r>
+            <a:endParaRPr lang="en-US"/>
+          </a:p>
+          <a:p>
+            <a:pPr marL="0" indent="0">
+              <a:buNone/>
+            </a:pPr>
+            <a:r>
+              <a:rPr lang="en-US">
+                <a:sym typeface="+mn-ea"/>
+              </a:rPr>
+              <a:t>Make sure that the dataframe generally follow common sense checks, e.g. the size of the dataframes make sense in comparison with one another.</a:t>
+            </a:r>
+            <a:endParaRPr lang="en-US"/>
+          </a:p>
+          <a:p>
+            <a:pPr marL="0" indent="0">
+              <a:buNone/>
+            </a:pPr>
+            <a:r>
+              <a:rPr lang="en-US">
+                <a:sym typeface="+mn-ea"/>
+              </a:rPr>
+              <a:t>Make sure the foreign keys match up and you can use previously generated dataframes when creating each consecutive dataframes.</a:t>
+            </a:r>
+            <a:endParaRPr lang="en-US"/>
+          </a:p>
+          <a:p>
+            <a:pPr marL="0" indent="0">
+              <a:buNone/>
+            </a:pPr>
+            <a:r>
+              <a:rPr lang="en-US">
+                <a:sym typeface="+mn-ea"/>
+              </a:rPr>
+              <a:t>You can use the previously generated dataframe to generate the next dataframe.</a:t>
+            </a:r>
+            <a:endParaRPr lang="en-US"/>
+          </a:p>
+          <a:p>
+            <a:pPr marL="0" indent="0">
+              <a:buNone/>
+            </a:pPr>
+            <a:r>
+              <a:rPr lang="en-US">
+                <a:sym typeface="+mn-ea"/>
+              </a:rPr>
               <a:t>"""</a:t>
             </a:r>
             <a:endParaRPr lang="en-US"/>
@@ -9132,116 +9162,6 @@
             <a:pPr marL="0" indent="0">
               <a:buNone/>
             </a:pPr>
-            <a:r>
-              <a:rPr lang="en-US"/>
-              <a:t>  I am creating input output training pairs to fine tune my gpt model. The usecase is a retailer generating a description for a product from a product catalogue. I want the input to be product name and category (to which the product belongs to) and output to be description.</a:t>
-            </a:r>
-            <a:endParaRPr lang="en-US"/>
-          </a:p>
-          <a:p>
-            <a:pPr marL="0" indent="0">
-              <a:buNone/>
-            </a:pPr>
-            <a:r>
-              <a:rPr lang="en-US"/>
-              <a:t>  The format should be of the form:</a:t>
-            </a:r>
-            <a:endParaRPr lang="en-US"/>
-          </a:p>
-          <a:p>
-            <a:pPr marL="0" indent="0">
-              <a:buNone/>
-            </a:pPr>
-            <a:r>
-              <a:rPr lang="en-US"/>
-              <a:t>  1.</a:t>
-            </a:r>
-            <a:endParaRPr lang="en-US"/>
-          </a:p>
-          <a:p>
-            <a:pPr marL="0" indent="0">
-              <a:buNone/>
-            </a:pPr>
-            <a:r>
-              <a:rPr lang="en-US"/>
-              <a:t>  Input: product_name, category</a:t>
-            </a:r>
-            <a:endParaRPr lang="en-US"/>
-          </a:p>
-          <a:p>
-            <a:pPr marL="0" indent="0">
-              <a:buNone/>
-            </a:pPr>
-            <a:r>
-              <a:rPr lang="en-US"/>
-              <a:t>  Output: description</a:t>
-            </a:r>
-            <a:endParaRPr lang="en-US"/>
-          </a:p>
-          <a:p>
-            <a:pPr marL="0" indent="0">
-              <a:buNone/>
-            </a:pPr>
-            <a:r>
-              <a:rPr lang="en-US"/>
-              <a:t>  2.</a:t>
-            </a:r>
-            <a:endParaRPr lang="en-US"/>
-          </a:p>
-          <a:p>
-            <a:pPr marL="0" indent="0">
-              <a:buNone/>
-            </a:pPr>
-            <a:r>
-              <a:rPr lang="en-US"/>
-              <a:t>  Input: product_name, category</a:t>
-            </a:r>
-            <a:endParaRPr lang="en-US"/>
-          </a:p>
-          <a:p>
-            <a:pPr marL="0" indent="0">
-              <a:buNone/>
-            </a:pPr>
-            <a:r>
-              <a:rPr lang="en-US"/>
-              <a:t>  Output: description</a:t>
-            </a:r>
-            <a:endParaRPr lang="en-US"/>
-          </a:p>
-          <a:p>
-            <a:pPr marL="0" indent="0">
-              <a:buNone/>
-            </a:pPr>
-            <a:endParaRPr lang="en-US"/>
-          </a:p>
-          <a:p>
-            <a:pPr marL="0" indent="0">
-              <a:buNone/>
-            </a:pPr>
-            <a:r>
-              <a:rPr lang="en-US"/>
-              <a:t>  Do not add any extra characters around that formatting as it will make the output parsing break.</a:t>
-            </a:r>
-            <a:endParaRPr lang="en-US"/>
-          </a:p>
-          <a:p>
-            <a:pPr marL="0" indent="0">
-              <a:buNone/>
-            </a:pPr>
-            <a:r>
-              <a:rPr lang="en-US"/>
-              <a:t>  Create as many training pairs as possible.</a:t>
-            </a:r>
-            <a:endParaRPr lang="en-US"/>
-          </a:p>
-          <a:p>
-            <a:pPr marL="0" indent="0">
-              <a:buNone/>
-            </a:pPr>
-            <a:r>
-              <a:rPr lang="en-US"/>
-              <a:t>  """</a:t>
-            </a:r>
             <a:endParaRPr lang="en-US"/>
           </a:p>
         </p:txBody>
@@ -9280,15 +9200,15 @@
           <a:p>
             <a:r>
               <a:rPr lang="en-US"/>
-              <a:t>result </a:t>
-            </a:r>
-            <a:endParaRPr lang="en-US"/>
-          </a:p>
-        </p:txBody>
-      </p:sp>
-      <p:sp>
-        <p:nvSpPr>
-          <p:cNvPr id="3" name="Content Placeholder 2"/>
+              <a:t>creating textual data</a:t>
+            </a:r>
+            <a:endParaRPr lang="en-US"/>
+          </a:p>
+        </p:txBody>
+      </p:sp>
+      <p:sp>
+        <p:nvSpPr>
+          <p:cNvPr id="5" name="Content Placeholder 4"/>
           <p:cNvSpPr>
             <a:spLocks noGrp="1"/>
           </p:cNvSpPr>
@@ -9299,157 +9219,133 @@
         <p:spPr/>
         <p:txBody>
           <a:bodyPr>
-            <a:noAutofit/>
+            <a:normAutofit fontScale="50000"/>
           </a:bodyPr>
           <a:p>
             <a:pPr marL="0" indent="0">
               <a:buNone/>
             </a:pPr>
             <a:r>
-              <a:rPr lang="en-US" sz="1200"/>
-              <a:t>1.</a:t>
-            </a:r>
-            <a:endParaRPr lang="en-US" sz="1200"/>
+              <a:rPr lang="en-US"/>
+              <a:t>"""</a:t>
+            </a:r>
+            <a:endParaRPr lang="en-US"/>
           </a:p>
           <a:p>
             <a:pPr marL="0" indent="0">
               <a:buNone/>
             </a:pPr>
             <a:r>
-              <a:rPr lang="en-US" sz="1200"/>
-              <a:t>Input: Wireless Bluetooth Headphones, Electronics</a:t>
-            </a:r>
-            <a:endParaRPr lang="en-US" sz="1200"/>
+              <a:rPr lang="en-US"/>
+              <a:t>  I am creating input output training pairs to fine tune my gpt model. The usecase is a retailer generating a description for a product from a product catalogue. I want the input to be product name and category (to which the product belongs to) and output to be description.</a:t>
+            </a:r>
+            <a:endParaRPr lang="en-US"/>
           </a:p>
           <a:p>
             <a:pPr marL="0" indent="0">
               <a:buNone/>
             </a:pPr>
             <a:r>
-              <a:rPr lang="en-US" sz="1200"/>
-              <a:t>Output: Immerse yourself in high-quality sound with these Wireless Bluetooth Headphones, featuring active noise cancellation and a comfortable over-ear design for extended listening sessions.</a:t>
-            </a:r>
-            <a:endParaRPr lang="en-US" sz="1200"/>
+              <a:rPr lang="en-US"/>
+              <a:t>  The format should be of the form:</a:t>
+            </a:r>
+            <a:endParaRPr lang="en-US"/>
           </a:p>
           <a:p>
             <a:pPr marL="0" indent="0">
               <a:buNone/>
             </a:pPr>
             <a:r>
-              <a:rPr lang="en-US" sz="1200"/>
-              <a:t>2.</a:t>
-            </a:r>
-            <a:endParaRPr lang="en-US" sz="1200"/>
+              <a:rPr lang="en-US"/>
+              <a:t>  1.</a:t>
+            </a:r>
+            <a:endParaRPr lang="en-US"/>
           </a:p>
           <a:p>
             <a:pPr marL="0" indent="0">
               <a:buNone/>
             </a:pPr>
             <a:r>
-              <a:rPr lang="en-US" sz="1200"/>
-              <a:t>Input: Organic Green Tea, Beverages</a:t>
-            </a:r>
-            <a:endParaRPr lang="en-US" sz="1200"/>
+              <a:rPr lang="en-US"/>
+              <a:t>  Input: product_name, category</a:t>
+            </a:r>
+            <a:endParaRPr lang="en-US"/>
           </a:p>
           <a:p>
             <a:pPr marL="0" indent="0">
               <a:buNone/>
             </a:pPr>
             <a:r>
-              <a:rPr lang="en-US" sz="1200"/>
-              <a:t>Output: Enjoy a refreshing cup of Organic Green Tea, sourced from the finest leaves, packed with antioxidants, and perfect for a healthy, invigorating boost anytime.</a:t>
-            </a:r>
-            <a:endParaRPr lang="en-US" sz="1200"/>
+              <a:rPr lang="en-US"/>
+              <a:t>  Output: description</a:t>
+            </a:r>
+            <a:endParaRPr lang="en-US"/>
           </a:p>
           <a:p>
             <a:pPr marL="0" indent="0">
               <a:buNone/>
             </a:pPr>
             <a:r>
-              <a:rPr lang="en-US" sz="1200"/>
-              <a:t>3.</a:t>
-            </a:r>
-            <a:endParaRPr lang="en-US" sz="1200"/>
+              <a:rPr lang="en-US"/>
+              <a:t>  2.</a:t>
+            </a:r>
+            <a:endParaRPr lang="en-US"/>
           </a:p>
           <a:p>
             <a:pPr marL="0" indent="0">
               <a:buNone/>
             </a:pPr>
             <a:r>
-              <a:rPr lang="en-US" sz="1200"/>
-              <a:t>Input: Stainless Steel Kitchen Knife, Kitchenware</a:t>
-            </a:r>
-            <a:endParaRPr lang="en-US" sz="1200"/>
+              <a:rPr lang="en-US"/>
+              <a:t>  Input: product_name, category</a:t>
+            </a:r>
+            <a:endParaRPr lang="en-US"/>
           </a:p>
           <a:p>
             <a:pPr marL="0" indent="0">
               <a:buNone/>
             </a:pPr>
             <a:r>
-              <a:rPr lang="en-US" sz="1200"/>
-              <a:t>Output: Cut with precision and ease using this Stainless Steel Kitchen Knife, designed with an ergonomic handle and a sharp blade for all your culinary tasks.</a:t>
-            </a:r>
-            <a:endParaRPr lang="en-US" sz="1200"/>
+              <a:rPr lang="en-US"/>
+              <a:t>  Output: description</a:t>
+            </a:r>
+            <a:endParaRPr lang="en-US"/>
           </a:p>
           <a:p>
             <a:pPr marL="0" indent="0">
               <a:buNone/>
             </a:pPr>
-            <a:r>
-              <a:rPr lang="en-US" sz="1200"/>
-              <a:t>4.</a:t>
-            </a:r>
-            <a:endParaRPr lang="en-US" sz="1200"/>
+            <a:endParaRPr lang="en-US"/>
           </a:p>
           <a:p>
             <a:pPr marL="0" indent="0">
               <a:buNone/>
             </a:pPr>
             <a:r>
-              <a:rPr lang="en-US" sz="1200"/>
-              <a:t>Input: Hiking Backpack, Outdoor Gear</a:t>
-            </a:r>
-            <a:endParaRPr lang="en-US" sz="1200"/>
+              <a:rPr lang="en-US"/>
+              <a:t>  Do not add any extra characters around that formatting as it will make the output parsing break.</a:t>
+            </a:r>
+            <a:endParaRPr lang="en-US"/>
           </a:p>
           <a:p>
             <a:pPr marL="0" indent="0">
               <a:buNone/>
             </a:pPr>
             <a:r>
-              <a:rPr lang="en-US" sz="1200"/>
-              <a:t>Output: Explore the great outdoors with this durable Hiking Backpack, featuring multiple compartments for optimal organization and a breathable design for ultimate comfort on long treks.</a:t>
-            </a:r>
-            <a:endParaRPr lang="en-US" sz="1200"/>
+              <a:rPr lang="en-US"/>
+              <a:t>  Create as many training pairs as possible.</a:t>
+            </a:r>
+            <a:endParaRPr lang="en-US"/>
           </a:p>
           <a:p>
             <a:pPr marL="0" indent="0">
               <a:buNone/>
             </a:pPr>
             <a:r>
-              <a:rPr lang="en-US" sz="1200"/>
-              <a:t>5.</a:t>
-            </a:r>
-            <a:endParaRPr lang="en-US" sz="1200"/>
-          </a:p>
-          <a:p>
-            <a:pPr marL="0" indent="0">
-              <a:buNone/>
-            </a:pPr>
-            <a:r>
-              <a:rPr lang="en-US" sz="1200"/>
-              <a:t>Input: Air Fryer, Kitchen Appliances</a:t>
-            </a:r>
-            <a:endParaRPr lang="en-US" sz="1200"/>
-          </a:p>
-          <a:p>
-            <a:pPr marL="0" indent="0">
-              <a:buNone/>
-            </a:pPr>
-            <a:r>
-              <a:rPr lang="en-US" sz="1200"/>
-              <a:t>Output: Cook your favorite meals with less oil using this Air Fryer</a:t>
-            </a:r>
-            <a:endParaRPr lang="en-US" sz="1200"/>
+              <a:rPr lang="en-US"/>
+              <a:t>  """</a:t>
+            </a:r>
+            <a:endParaRPr lang="en-US"/>
           </a:p>
         </p:txBody>
       </p:sp>
@@ -9487,7 +9383,7 @@
           <a:p>
             <a:r>
               <a:rPr lang="en-US"/>
-              <a:t>Tools </a:t>
+              <a:t>result </a:t>
             </a:r>
             <a:endParaRPr lang="en-US"/>
           </a:p>
@@ -9505,13 +9401,158 @@
         </p:nvSpPr>
         <p:spPr/>
         <p:txBody>
-          <a:bodyPr/>
-          <a:p>
-            <a:r>
-              <a:rPr lang="en-US"/>
-              <a:t>https://gretel.ai</a:t>
-            </a:r>
-            <a:endParaRPr lang="en-US"/>
+          <a:bodyPr>
+            <a:noAutofit/>
+          </a:bodyPr>
+          <a:p>
+            <a:pPr marL="0" indent="0">
+              <a:buNone/>
+            </a:pPr>
+            <a:r>
+              <a:rPr lang="en-US" sz="1200"/>
+              <a:t>1.</a:t>
+            </a:r>
+            <a:endParaRPr lang="en-US" sz="1200"/>
+          </a:p>
+          <a:p>
+            <a:pPr marL="0" indent="0">
+              <a:buNone/>
+            </a:pPr>
+            <a:r>
+              <a:rPr lang="en-US" sz="1200"/>
+              <a:t>Input: Wireless Bluetooth Headphones, Electronics</a:t>
+            </a:r>
+            <a:endParaRPr lang="en-US" sz="1200"/>
+          </a:p>
+          <a:p>
+            <a:pPr marL="0" indent="0">
+              <a:buNone/>
+            </a:pPr>
+            <a:r>
+              <a:rPr lang="en-US" sz="1200"/>
+              <a:t>Output: Immerse yourself in high-quality sound with these Wireless Bluetooth Headphones, featuring active noise cancellation and a comfortable over-ear design for extended listening sessions.</a:t>
+            </a:r>
+            <a:endParaRPr lang="en-US" sz="1200"/>
+          </a:p>
+          <a:p>
+            <a:pPr marL="0" indent="0">
+              <a:buNone/>
+            </a:pPr>
+            <a:r>
+              <a:rPr lang="en-US" sz="1200"/>
+              <a:t>2.</a:t>
+            </a:r>
+            <a:endParaRPr lang="en-US" sz="1200"/>
+          </a:p>
+          <a:p>
+            <a:pPr marL="0" indent="0">
+              <a:buNone/>
+            </a:pPr>
+            <a:r>
+              <a:rPr lang="en-US" sz="1200"/>
+              <a:t>Input: Organic Green Tea, Beverages</a:t>
+            </a:r>
+            <a:endParaRPr lang="en-US" sz="1200"/>
+          </a:p>
+          <a:p>
+            <a:pPr marL="0" indent="0">
+              <a:buNone/>
+            </a:pPr>
+            <a:r>
+              <a:rPr lang="en-US" sz="1200"/>
+              <a:t>Output: Enjoy a refreshing cup of Organic Green Tea, sourced from the finest leaves, packed with antioxidants, and perfect for a healthy, invigorating boost anytime.</a:t>
+            </a:r>
+            <a:endParaRPr lang="en-US" sz="1200"/>
+          </a:p>
+          <a:p>
+            <a:pPr marL="0" indent="0">
+              <a:buNone/>
+            </a:pPr>
+            <a:r>
+              <a:rPr lang="en-US" sz="1200"/>
+              <a:t>3.</a:t>
+            </a:r>
+            <a:endParaRPr lang="en-US" sz="1200"/>
+          </a:p>
+          <a:p>
+            <a:pPr marL="0" indent="0">
+              <a:buNone/>
+            </a:pPr>
+            <a:r>
+              <a:rPr lang="en-US" sz="1200"/>
+              <a:t>Input: Stainless Steel Kitchen Knife, Kitchenware</a:t>
+            </a:r>
+            <a:endParaRPr lang="en-US" sz="1200"/>
+          </a:p>
+          <a:p>
+            <a:pPr marL="0" indent="0">
+              <a:buNone/>
+            </a:pPr>
+            <a:r>
+              <a:rPr lang="en-US" sz="1200"/>
+              <a:t>Output: Cut with precision and ease using this Stainless Steel Kitchen Knife, designed with an ergonomic handle and a sharp blade for all your culinary tasks.</a:t>
+            </a:r>
+            <a:endParaRPr lang="en-US" sz="1200"/>
+          </a:p>
+          <a:p>
+            <a:pPr marL="0" indent="0">
+              <a:buNone/>
+            </a:pPr>
+            <a:r>
+              <a:rPr lang="en-US" sz="1200"/>
+              <a:t>4.</a:t>
+            </a:r>
+            <a:endParaRPr lang="en-US" sz="1200"/>
+          </a:p>
+          <a:p>
+            <a:pPr marL="0" indent="0">
+              <a:buNone/>
+            </a:pPr>
+            <a:r>
+              <a:rPr lang="en-US" sz="1200"/>
+              <a:t>Input: Hiking Backpack, Outdoor Gear</a:t>
+            </a:r>
+            <a:endParaRPr lang="en-US" sz="1200"/>
+          </a:p>
+          <a:p>
+            <a:pPr marL="0" indent="0">
+              <a:buNone/>
+            </a:pPr>
+            <a:r>
+              <a:rPr lang="en-US" sz="1200"/>
+              <a:t>Output: Explore the great outdoors with this durable Hiking Backpack, featuring multiple compartments for optimal organization and a breathable design for ultimate comfort on long treks.</a:t>
+            </a:r>
+            <a:endParaRPr lang="en-US" sz="1200"/>
+          </a:p>
+          <a:p>
+            <a:pPr marL="0" indent="0">
+              <a:buNone/>
+            </a:pPr>
+            <a:r>
+              <a:rPr lang="en-US" sz="1200"/>
+              <a:t>5.</a:t>
+            </a:r>
+            <a:endParaRPr lang="en-US" sz="1200"/>
+          </a:p>
+          <a:p>
+            <a:pPr marL="0" indent="0">
+              <a:buNone/>
+            </a:pPr>
+            <a:r>
+              <a:rPr lang="en-US" sz="1200"/>
+              <a:t>Input: Air Fryer, Kitchen Appliances</a:t>
+            </a:r>
+            <a:endParaRPr lang="en-US" sz="1200"/>
+          </a:p>
+          <a:p>
+            <a:pPr marL="0" indent="0">
+              <a:buNone/>
+            </a:pPr>
+            <a:r>
+              <a:rPr lang="en-US" sz="1200"/>
+              <a:t>Output: Cook your favorite meals with less oil using this Air Fryer</a:t>
+            </a:r>
+            <a:endParaRPr lang="en-US" sz="1200"/>
           </a:p>
         </p:txBody>
       </p:sp>
@@ -9524,6 +9565,68 @@
 </file>
 
 <file path=ppt/slides/slide25.xml><?xml version="1.0" encoding="utf-8"?>
+<p:sld xmlns:a="http://schemas.openxmlformats.org/drawingml/2006/main" xmlns:r="http://schemas.openxmlformats.org/officeDocument/2006/relationships" xmlns:p="http://schemas.openxmlformats.org/presentationml/2006/main">
+  <p:cSld>
+    <p:spTree>
+      <p:nvGrpSpPr>
+        <p:cNvPr id="1" name=""/>
+        <p:cNvGrpSpPr/>
+        <p:nvPr/>
+      </p:nvGrpSpPr>
+      <p:grpSpPr/>
+      <p:sp>
+        <p:nvSpPr>
+          <p:cNvPr id="2" name="Title 1"/>
+          <p:cNvSpPr>
+            <a:spLocks noGrp="1"/>
+          </p:cNvSpPr>
+          <p:nvPr>
+            <p:ph type="title"/>
+          </p:nvPr>
+        </p:nvSpPr>
+        <p:spPr/>
+        <p:txBody>
+          <a:bodyPr/>
+          <a:p>
+            <a:r>
+              <a:rPr lang="en-US"/>
+              <a:t>Tools </a:t>
+            </a:r>
+            <a:endParaRPr lang="en-US"/>
+          </a:p>
+        </p:txBody>
+      </p:sp>
+      <p:sp>
+        <p:nvSpPr>
+          <p:cNvPr id="3" name="Content Placeholder 2"/>
+          <p:cNvSpPr>
+            <a:spLocks noGrp="1"/>
+          </p:cNvSpPr>
+          <p:nvPr>
+            <p:ph idx="1"/>
+          </p:nvPr>
+        </p:nvSpPr>
+        <p:spPr/>
+        <p:txBody>
+          <a:bodyPr/>
+          <a:p>
+            <a:r>
+              <a:rPr lang="en-US"/>
+              <a:t>https://gretel.ai</a:t>
+            </a:r>
+            <a:endParaRPr lang="en-US"/>
+          </a:p>
+        </p:txBody>
+      </p:sp>
+    </p:spTree>
+  </p:cSld>
+  <p:clrMapOvr>
+    <a:masterClrMapping/>
+  </p:clrMapOvr>
+</p:sld>
+</file>
+
+<file path=ppt/slides/slide26.xml><?xml version="1.0" encoding="utf-8"?>
 <p:sld xmlns:a="http://schemas.openxmlformats.org/drawingml/2006/main" xmlns:r="http://schemas.openxmlformats.org/officeDocument/2006/relationships" xmlns:p="http://schemas.openxmlformats.org/presentationml/2006/main">
   <p:cSld>
     <p:spTree>

</xml_diff>